<commit_message>
lesson array digital signal , add more content
</commit_message>
<xml_diff>
--- a/課程資料/陣列與影音數位化/圖片.pptx
+++ b/課程資料/陣列與影音數位化/圖片.pptx
@@ -7,6 +7,11 @@
   <p:sldIdLst>
     <p:sldId id="256" r:id="rId2"/>
     <p:sldId id="257" r:id="rId3"/>
+    <p:sldId id="258" r:id="rId4"/>
+    <p:sldId id="259" r:id="rId5"/>
+    <p:sldId id="260" r:id="rId6"/>
+    <p:sldId id="261" r:id="rId7"/>
+    <p:sldId id="262" r:id="rId8"/>
   </p:sldIdLst>
   <p:sldSz cx="12192000" cy="6858000"/>
   <p:notesSz cx="6858000" cy="9144000"/>
@@ -260,7 +265,7 @@
           <a:p>
             <a:fld id="{654F12FA-3442-41A6-816F-4A42488F30BB}" type="datetimeFigureOut">
               <a:rPr lang="zh-TW" altLang="en-US" smtClean="0"/>
-              <a:t>2022/12/4</a:t>
+              <a:t>2023/1/5</a:t>
             </a:fld>
             <a:endParaRPr lang="zh-TW" altLang="en-US"/>
           </a:p>
@@ -458,7 +463,7 @@
           <a:p>
             <a:fld id="{654F12FA-3442-41A6-816F-4A42488F30BB}" type="datetimeFigureOut">
               <a:rPr lang="zh-TW" altLang="en-US" smtClean="0"/>
-              <a:t>2022/12/4</a:t>
+              <a:t>2023/1/5</a:t>
             </a:fld>
             <a:endParaRPr lang="zh-TW" altLang="en-US"/>
           </a:p>
@@ -666,7 +671,7 @@
           <a:p>
             <a:fld id="{654F12FA-3442-41A6-816F-4A42488F30BB}" type="datetimeFigureOut">
               <a:rPr lang="zh-TW" altLang="en-US" smtClean="0"/>
-              <a:t>2022/12/4</a:t>
+              <a:t>2023/1/5</a:t>
             </a:fld>
             <a:endParaRPr lang="zh-TW" altLang="en-US"/>
           </a:p>
@@ -864,7 +869,7 @@
           <a:p>
             <a:fld id="{654F12FA-3442-41A6-816F-4A42488F30BB}" type="datetimeFigureOut">
               <a:rPr lang="zh-TW" altLang="en-US" smtClean="0"/>
-              <a:t>2022/12/4</a:t>
+              <a:t>2023/1/5</a:t>
             </a:fld>
             <a:endParaRPr lang="zh-TW" altLang="en-US"/>
           </a:p>
@@ -1139,7 +1144,7 @@
           <a:p>
             <a:fld id="{654F12FA-3442-41A6-816F-4A42488F30BB}" type="datetimeFigureOut">
               <a:rPr lang="zh-TW" altLang="en-US" smtClean="0"/>
-              <a:t>2022/12/4</a:t>
+              <a:t>2023/1/5</a:t>
             </a:fld>
             <a:endParaRPr lang="zh-TW" altLang="en-US"/>
           </a:p>
@@ -1404,7 +1409,7 @@
           <a:p>
             <a:fld id="{654F12FA-3442-41A6-816F-4A42488F30BB}" type="datetimeFigureOut">
               <a:rPr lang="zh-TW" altLang="en-US" smtClean="0"/>
-              <a:t>2022/12/4</a:t>
+              <a:t>2023/1/5</a:t>
             </a:fld>
             <a:endParaRPr lang="zh-TW" altLang="en-US"/>
           </a:p>
@@ -1816,7 +1821,7 @@
           <a:p>
             <a:fld id="{654F12FA-3442-41A6-816F-4A42488F30BB}" type="datetimeFigureOut">
               <a:rPr lang="zh-TW" altLang="en-US" smtClean="0"/>
-              <a:t>2022/12/4</a:t>
+              <a:t>2023/1/5</a:t>
             </a:fld>
             <a:endParaRPr lang="zh-TW" altLang="en-US"/>
           </a:p>
@@ -1957,7 +1962,7 @@
           <a:p>
             <a:fld id="{654F12FA-3442-41A6-816F-4A42488F30BB}" type="datetimeFigureOut">
               <a:rPr lang="zh-TW" altLang="en-US" smtClean="0"/>
-              <a:t>2022/12/4</a:t>
+              <a:t>2023/1/5</a:t>
             </a:fld>
             <a:endParaRPr lang="zh-TW" altLang="en-US"/>
           </a:p>
@@ -2070,7 +2075,7 @@
           <a:p>
             <a:fld id="{654F12FA-3442-41A6-816F-4A42488F30BB}" type="datetimeFigureOut">
               <a:rPr lang="zh-TW" altLang="en-US" smtClean="0"/>
-              <a:t>2022/12/4</a:t>
+              <a:t>2023/1/5</a:t>
             </a:fld>
             <a:endParaRPr lang="zh-TW" altLang="en-US"/>
           </a:p>
@@ -2381,7 +2386,7 @@
           <a:p>
             <a:fld id="{654F12FA-3442-41A6-816F-4A42488F30BB}" type="datetimeFigureOut">
               <a:rPr lang="zh-TW" altLang="en-US" smtClean="0"/>
-              <a:t>2022/12/4</a:t>
+              <a:t>2023/1/5</a:t>
             </a:fld>
             <a:endParaRPr lang="zh-TW" altLang="en-US"/>
           </a:p>
@@ -2669,7 +2674,7 @@
           <a:p>
             <a:fld id="{654F12FA-3442-41A6-816F-4A42488F30BB}" type="datetimeFigureOut">
               <a:rPr lang="zh-TW" altLang="en-US" smtClean="0"/>
-              <a:t>2022/12/4</a:t>
+              <a:t>2023/1/5</a:t>
             </a:fld>
             <a:endParaRPr lang="zh-TW" altLang="en-US"/>
           </a:p>
@@ -2910,7 +2915,7 @@
           <a:p>
             <a:fld id="{654F12FA-3442-41A6-816F-4A42488F30BB}" type="datetimeFigureOut">
               <a:rPr lang="zh-TW" altLang="en-US" smtClean="0"/>
-              <a:t>2022/12/4</a:t>
+              <a:t>2023/1/5</a:t>
             </a:fld>
             <a:endParaRPr lang="zh-TW" altLang="en-US"/>
           </a:p>
@@ -3573,6 +3578,1081 @@
 </p:sld>
 </file>
 
+<file path=ppt/slides/slide3.xml><?xml version="1.0" encoding="utf-8"?>
+<p:sld xmlns:a="http://schemas.openxmlformats.org/drawingml/2006/main" xmlns:r="http://schemas.openxmlformats.org/officeDocument/2006/relationships" xmlns:p="http://schemas.openxmlformats.org/presentationml/2006/main">
+  <p:cSld>
+    <p:spTree>
+      <p:nvGrpSpPr>
+        <p:cNvPr id="1" name=""/>
+        <p:cNvGrpSpPr/>
+        <p:nvPr/>
+      </p:nvGrpSpPr>
+      <p:grpSpPr>
+        <a:xfrm>
+          <a:off x="0" y="0"/>
+          <a:ext cx="0" cy="0"/>
+          <a:chOff x="0" y="0"/>
+          <a:chExt cx="0" cy="0"/>
+        </a:xfrm>
+      </p:grpSpPr>
+      <p:pic>
+        <p:nvPicPr>
+          <p:cNvPr id="4" name="圖片 3">
+            <a:extLst>
+              <a:ext uri="{FF2B5EF4-FFF2-40B4-BE49-F238E27FC236}">
+                <a16:creationId xmlns:a16="http://schemas.microsoft.com/office/drawing/2014/main" id="{173474F7-2F28-4AD9-93B8-10ABAF7BF287}"/>
+              </a:ext>
+            </a:extLst>
+          </p:cNvPr>
+          <p:cNvPicPr>
+            <a:picLocks noChangeAspect="1"/>
+          </p:cNvPicPr>
+          <p:nvPr/>
+        </p:nvPicPr>
+        <p:blipFill>
+          <a:blip r:embed="rId2"/>
+          <a:stretch>
+            <a:fillRect/>
+          </a:stretch>
+        </p:blipFill>
+        <p:spPr>
+          <a:xfrm>
+            <a:off x="129209" y="1145602"/>
+            <a:ext cx="2916821" cy="2223764"/>
+          </a:xfrm>
+          <a:prstGeom prst="rect">
+            <a:avLst/>
+          </a:prstGeom>
+          <a:ln w="3175" cap="sq">
+            <a:solidFill>
+              <a:srgbClr val="000000"/>
+            </a:solidFill>
+            <a:prstDash val="solid"/>
+            <a:miter lim="800000"/>
+          </a:ln>
+          <a:effectLst>
+            <a:outerShdw blurRad="50800" dist="38100" dir="2700000" algn="tl" rotWithShape="0">
+              <a:srgbClr val="000000">
+                <a:alpha val="43000"/>
+              </a:srgbClr>
+            </a:outerShdw>
+          </a:effectLst>
+        </p:spPr>
+      </p:pic>
+      <p:pic>
+        <p:nvPicPr>
+          <p:cNvPr id="5" name="圖片 4">
+            <a:extLst>
+              <a:ext uri="{FF2B5EF4-FFF2-40B4-BE49-F238E27FC236}">
+                <a16:creationId xmlns:a16="http://schemas.microsoft.com/office/drawing/2014/main" id="{F36C78D1-78E7-45DB-87E2-7DFB860A69DD}"/>
+              </a:ext>
+            </a:extLst>
+          </p:cNvPr>
+          <p:cNvPicPr>
+            <a:picLocks noChangeAspect="1"/>
+          </p:cNvPicPr>
+          <p:nvPr/>
+        </p:nvPicPr>
+        <p:blipFill>
+          <a:blip r:embed="rId3"/>
+          <a:stretch>
+            <a:fillRect/>
+          </a:stretch>
+        </p:blipFill>
+        <p:spPr>
+          <a:xfrm>
+            <a:off x="1909247" y="2292346"/>
+            <a:ext cx="937892" cy="864705"/>
+          </a:xfrm>
+          <a:prstGeom prst="rect">
+            <a:avLst/>
+          </a:prstGeom>
+          <a:ln>
+            <a:noFill/>
+          </a:ln>
+          <a:effectLst>
+            <a:softEdge rad="112500"/>
+          </a:effectLst>
+        </p:spPr>
+      </p:pic>
+      <p:pic>
+        <p:nvPicPr>
+          <p:cNvPr id="6" name="圖片 5">
+            <a:extLst>
+              <a:ext uri="{FF2B5EF4-FFF2-40B4-BE49-F238E27FC236}">
+                <a16:creationId xmlns:a16="http://schemas.microsoft.com/office/drawing/2014/main" id="{00953785-C63D-4946-BC91-08D248857E92}"/>
+              </a:ext>
+            </a:extLst>
+          </p:cNvPr>
+          <p:cNvPicPr>
+            <a:picLocks noChangeAspect="1"/>
+          </p:cNvPicPr>
+          <p:nvPr/>
+        </p:nvPicPr>
+        <p:blipFill>
+          <a:blip r:embed="rId4"/>
+          <a:stretch>
+            <a:fillRect/>
+          </a:stretch>
+        </p:blipFill>
+        <p:spPr>
+          <a:xfrm>
+            <a:off x="469537" y="1372989"/>
+            <a:ext cx="859993" cy="919357"/>
+          </a:xfrm>
+          <a:prstGeom prst="rect">
+            <a:avLst/>
+          </a:prstGeom>
+          <a:ln>
+            <a:noFill/>
+          </a:ln>
+          <a:effectLst>
+            <a:softEdge rad="112500"/>
+          </a:effectLst>
+        </p:spPr>
+      </p:pic>
+      <p:pic>
+        <p:nvPicPr>
+          <p:cNvPr id="8" name="圖片 7">
+            <a:extLst>
+              <a:ext uri="{FF2B5EF4-FFF2-40B4-BE49-F238E27FC236}">
+                <a16:creationId xmlns:a16="http://schemas.microsoft.com/office/drawing/2014/main" id="{B46D6C77-CE0F-4386-B465-E9B2A7D72E5B}"/>
+              </a:ext>
+            </a:extLst>
+          </p:cNvPr>
+          <p:cNvPicPr>
+            <a:picLocks noChangeAspect="1"/>
+          </p:cNvPicPr>
+          <p:nvPr/>
+        </p:nvPicPr>
+        <p:blipFill>
+          <a:blip r:embed="rId5">
+            <a:extLst>
+              <a:ext uri="{28A0092B-C50C-407E-A947-70E740481C1C}">
+                <a14:useLocalDpi xmlns:a14="http://schemas.microsoft.com/office/drawing/2010/main" val="0"/>
+              </a:ext>
+            </a:extLst>
+          </a:blip>
+          <a:stretch>
+            <a:fillRect/>
+          </a:stretch>
+        </p:blipFill>
+        <p:spPr>
+          <a:xfrm>
+            <a:off x="3178486" y="1145603"/>
+            <a:ext cx="2595252" cy="2223764"/>
+          </a:xfrm>
+          <a:prstGeom prst="rect">
+            <a:avLst/>
+          </a:prstGeom>
+          <a:ln w="3175" cap="sq">
+            <a:solidFill>
+              <a:srgbClr val="000000"/>
+            </a:solidFill>
+            <a:prstDash val="solid"/>
+            <a:miter lim="800000"/>
+          </a:ln>
+          <a:effectLst>
+            <a:outerShdw blurRad="50800" dist="38100" dir="2700000" algn="tl" rotWithShape="0">
+              <a:srgbClr val="000000">
+                <a:alpha val="43000"/>
+              </a:srgbClr>
+            </a:outerShdw>
+          </a:effectLst>
+        </p:spPr>
+      </p:pic>
+      <p:pic>
+        <p:nvPicPr>
+          <p:cNvPr id="10" name="圖片 9">
+            <a:extLst>
+              <a:ext uri="{FF2B5EF4-FFF2-40B4-BE49-F238E27FC236}">
+                <a16:creationId xmlns:a16="http://schemas.microsoft.com/office/drawing/2014/main" id="{BBE5B8AD-8661-48DB-829A-80B1FC12AE7E}"/>
+              </a:ext>
+            </a:extLst>
+          </p:cNvPr>
+          <p:cNvPicPr>
+            <a:picLocks noChangeAspect="1"/>
+          </p:cNvPicPr>
+          <p:nvPr/>
+        </p:nvPicPr>
+        <p:blipFill>
+          <a:blip r:embed="rId6">
+            <a:extLst>
+              <a:ext uri="{28A0092B-C50C-407E-A947-70E740481C1C}">
+                <a14:useLocalDpi xmlns:a14="http://schemas.microsoft.com/office/drawing/2010/main" val="0"/>
+              </a:ext>
+            </a:extLst>
+          </a:blip>
+          <a:stretch>
+            <a:fillRect/>
+          </a:stretch>
+        </p:blipFill>
+        <p:spPr>
+          <a:xfrm>
+            <a:off x="5906194" y="1145602"/>
+            <a:ext cx="4989215" cy="2223764"/>
+          </a:xfrm>
+          <a:prstGeom prst="rect">
+            <a:avLst/>
+          </a:prstGeom>
+          <a:ln w="6350" cap="sq">
+            <a:solidFill>
+              <a:srgbClr val="000000"/>
+            </a:solidFill>
+            <a:prstDash val="solid"/>
+            <a:miter lim="800000"/>
+          </a:ln>
+          <a:effectLst>
+            <a:outerShdw blurRad="50800" dist="38100" dir="2700000" algn="tl" rotWithShape="0">
+              <a:srgbClr val="000000">
+                <a:alpha val="43000"/>
+              </a:srgbClr>
+            </a:outerShdw>
+          </a:effectLst>
+        </p:spPr>
+      </p:pic>
+    </p:spTree>
+    <p:extLst>
+      <p:ext uri="{BB962C8B-B14F-4D97-AF65-F5344CB8AC3E}">
+        <p14:creationId xmlns:p14="http://schemas.microsoft.com/office/powerpoint/2010/main" val="3083614955"/>
+      </p:ext>
+    </p:extLst>
+  </p:cSld>
+  <p:clrMapOvr>
+    <a:masterClrMapping/>
+  </p:clrMapOvr>
+</p:sld>
+</file>
+
+<file path=ppt/slides/slide4.xml><?xml version="1.0" encoding="utf-8"?>
+<p:sld xmlns:a="http://schemas.openxmlformats.org/drawingml/2006/main" xmlns:r="http://schemas.openxmlformats.org/officeDocument/2006/relationships" xmlns:p="http://schemas.openxmlformats.org/presentationml/2006/main">
+  <p:cSld>
+    <p:spTree>
+      <p:nvGrpSpPr>
+        <p:cNvPr id="1" name=""/>
+        <p:cNvGrpSpPr/>
+        <p:nvPr/>
+      </p:nvGrpSpPr>
+      <p:grpSpPr>
+        <a:xfrm>
+          <a:off x="0" y="0"/>
+          <a:ext cx="0" cy="0"/>
+          <a:chOff x="0" y="0"/>
+          <a:chExt cx="0" cy="0"/>
+        </a:xfrm>
+      </p:grpSpPr>
+      <p:pic>
+        <p:nvPicPr>
+          <p:cNvPr id="4" name="圖片 3">
+            <a:extLst>
+              <a:ext uri="{FF2B5EF4-FFF2-40B4-BE49-F238E27FC236}">
+                <a16:creationId xmlns:a16="http://schemas.microsoft.com/office/drawing/2014/main" id="{006B023C-A1F1-46C7-B05E-366CB4A69CA3}"/>
+              </a:ext>
+            </a:extLst>
+          </p:cNvPr>
+          <p:cNvPicPr>
+            <a:picLocks noChangeAspect="1"/>
+          </p:cNvPicPr>
+          <p:nvPr/>
+        </p:nvPicPr>
+        <p:blipFill>
+          <a:blip r:embed="rId2"/>
+          <a:stretch>
+            <a:fillRect/>
+          </a:stretch>
+        </p:blipFill>
+        <p:spPr>
+          <a:xfrm>
+            <a:off x="791817" y="1067126"/>
+            <a:ext cx="4267200" cy="3411782"/>
+          </a:xfrm>
+          <a:prstGeom prst="rect">
+            <a:avLst/>
+          </a:prstGeom>
+        </p:spPr>
+      </p:pic>
+      <p:pic>
+        <p:nvPicPr>
+          <p:cNvPr id="5" name="圖片 4">
+            <a:extLst>
+              <a:ext uri="{FF2B5EF4-FFF2-40B4-BE49-F238E27FC236}">
+                <a16:creationId xmlns:a16="http://schemas.microsoft.com/office/drawing/2014/main" id="{2B4DAD48-F5B3-46C5-B7A8-C06777007358}"/>
+              </a:ext>
+            </a:extLst>
+          </p:cNvPr>
+          <p:cNvPicPr>
+            <a:picLocks noChangeAspect="1"/>
+          </p:cNvPicPr>
+          <p:nvPr/>
+        </p:nvPicPr>
+        <p:blipFill>
+          <a:blip r:embed="rId3"/>
+          <a:stretch>
+            <a:fillRect/>
+          </a:stretch>
+        </p:blipFill>
+        <p:spPr>
+          <a:xfrm>
+            <a:off x="5278324" y="1067125"/>
+            <a:ext cx="4240216" cy="3411781"/>
+          </a:xfrm>
+          <a:prstGeom prst="rect">
+            <a:avLst/>
+          </a:prstGeom>
+        </p:spPr>
+      </p:pic>
+      <p:sp>
+        <p:nvSpPr>
+          <p:cNvPr id="6" name="矩形 5">
+            <a:extLst>
+              <a:ext uri="{FF2B5EF4-FFF2-40B4-BE49-F238E27FC236}">
+                <a16:creationId xmlns:a16="http://schemas.microsoft.com/office/drawing/2014/main" id="{173C9763-1101-4A62-81C7-3C152D961992}"/>
+              </a:ext>
+            </a:extLst>
+          </p:cNvPr>
+          <p:cNvSpPr/>
+          <p:nvPr/>
+        </p:nvSpPr>
+        <p:spPr>
+          <a:xfrm>
+            <a:off x="2282279" y="4478906"/>
+            <a:ext cx="1286276" cy="646331"/>
+          </a:xfrm>
+          <a:prstGeom prst="rect">
+            <a:avLst/>
+          </a:prstGeom>
+          <a:noFill/>
+        </p:spPr>
+        <p:txBody>
+          <a:bodyPr wrap="square" lIns="91440" tIns="45720" rIns="91440" bIns="45720">
+            <a:spAutoFit/>
+          </a:bodyPr>
+          <a:lstStyle/>
+          <a:p>
+            <a:pPr algn="ctr"/>
+            <a:r>
+              <a:rPr lang="zh-TW" altLang="en-US" sz="3600" b="0" cap="none" spc="0" dirty="0">
+                <a:ln w="0"/>
+                <a:solidFill>
+                  <a:schemeClr val="tx1"/>
+                </a:solidFill>
+                <a:effectLst>
+                  <a:outerShdw blurRad="38100" dist="19050" dir="2700000" algn="tl" rotWithShape="0">
+                    <a:schemeClr val="dk1">
+                      <a:alpha val="40000"/>
+                    </a:schemeClr>
+                  </a:outerShdw>
+                </a:effectLst>
+                <a:latin typeface="微軟正黑體 Light" panose="020B0304030504040204" pitchFamily="34" charset="-120"/>
+                <a:ea typeface="微軟正黑體 Light" panose="020B0304030504040204" pitchFamily="34" charset="-120"/>
+              </a:rPr>
+              <a:t>原圖</a:t>
+            </a:r>
+          </a:p>
+        </p:txBody>
+      </p:sp>
+      <p:sp>
+        <p:nvSpPr>
+          <p:cNvPr id="7" name="矩形 6">
+            <a:extLst>
+              <a:ext uri="{FF2B5EF4-FFF2-40B4-BE49-F238E27FC236}">
+                <a16:creationId xmlns:a16="http://schemas.microsoft.com/office/drawing/2014/main" id="{461FC1B7-4024-48FA-BE6E-8201C98D3F52}"/>
+              </a:ext>
+            </a:extLst>
+          </p:cNvPr>
+          <p:cNvSpPr/>
+          <p:nvPr/>
+        </p:nvSpPr>
+        <p:spPr>
+          <a:xfrm>
+            <a:off x="5913782" y="4478905"/>
+            <a:ext cx="3266827" cy="646331"/>
+          </a:xfrm>
+          <a:prstGeom prst="rect">
+            <a:avLst/>
+          </a:prstGeom>
+          <a:noFill/>
+        </p:spPr>
+        <p:txBody>
+          <a:bodyPr wrap="square" lIns="91440" tIns="45720" rIns="91440" bIns="45720">
+            <a:spAutoFit/>
+          </a:bodyPr>
+          <a:lstStyle/>
+          <a:p>
+            <a:pPr algn="ctr"/>
+            <a:r>
+              <a:rPr lang="zh-TW" altLang="en-US" sz="3600" b="0" cap="none" spc="0" dirty="0">
+                <a:ln w="0"/>
+                <a:solidFill>
+                  <a:schemeClr val="tx1"/>
+                </a:solidFill>
+                <a:effectLst>
+                  <a:outerShdw blurRad="38100" dist="19050" dir="2700000" algn="tl" rotWithShape="0">
+                    <a:schemeClr val="dk1">
+                      <a:alpha val="40000"/>
+                    </a:schemeClr>
+                  </a:outerShdw>
+                </a:effectLst>
+                <a:latin typeface="微軟正黑體 Light" panose="020B0304030504040204" pitchFamily="34" charset="-120"/>
+                <a:ea typeface="微軟正黑體 Light" panose="020B0304030504040204" pitchFamily="34" charset="-120"/>
+              </a:rPr>
+              <a:t>模糊</a:t>
+            </a:r>
+            <a:r>
+              <a:rPr lang="en-US" altLang="zh-TW" sz="3600" b="0" cap="none" spc="0" dirty="0">
+                <a:ln w="0"/>
+                <a:solidFill>
+                  <a:schemeClr val="tx1"/>
+                </a:solidFill>
+                <a:effectLst>
+                  <a:outerShdw blurRad="38100" dist="19050" dir="2700000" algn="tl" rotWithShape="0">
+                    <a:schemeClr val="dk1">
+                      <a:alpha val="40000"/>
+                    </a:schemeClr>
+                  </a:outerShdw>
+                </a:effectLst>
+                <a:latin typeface="微軟正黑體 Light" panose="020B0304030504040204" pitchFamily="34" charset="-120"/>
+                <a:ea typeface="微軟正黑體 Light" panose="020B0304030504040204" pitchFamily="34" charset="-120"/>
+              </a:rPr>
+              <a:t>(kernel=5)</a:t>
+            </a:r>
+            <a:endParaRPr lang="zh-TW" altLang="en-US" sz="3600" b="0" cap="none" spc="0" dirty="0">
+              <a:ln w="0"/>
+              <a:solidFill>
+                <a:schemeClr val="tx1"/>
+              </a:solidFill>
+              <a:effectLst>
+                <a:outerShdw blurRad="38100" dist="19050" dir="2700000" algn="tl" rotWithShape="0">
+                  <a:schemeClr val="dk1">
+                    <a:alpha val="40000"/>
+                  </a:schemeClr>
+                </a:outerShdw>
+              </a:effectLst>
+              <a:latin typeface="微軟正黑體 Light" panose="020B0304030504040204" pitchFamily="34" charset="-120"/>
+              <a:ea typeface="微軟正黑體 Light" panose="020B0304030504040204" pitchFamily="34" charset="-120"/>
+            </a:endParaRPr>
+          </a:p>
+        </p:txBody>
+      </p:sp>
+    </p:spTree>
+    <p:extLst>
+      <p:ext uri="{BB962C8B-B14F-4D97-AF65-F5344CB8AC3E}">
+        <p14:creationId xmlns:p14="http://schemas.microsoft.com/office/powerpoint/2010/main" val="2267170524"/>
+      </p:ext>
+    </p:extLst>
+  </p:cSld>
+  <p:clrMapOvr>
+    <a:masterClrMapping/>
+  </p:clrMapOvr>
+</p:sld>
+</file>
+
+<file path=ppt/slides/slide5.xml><?xml version="1.0" encoding="utf-8"?>
+<p:sld xmlns:a="http://schemas.openxmlformats.org/drawingml/2006/main" xmlns:r="http://schemas.openxmlformats.org/officeDocument/2006/relationships" xmlns:p="http://schemas.openxmlformats.org/presentationml/2006/main">
+  <p:cSld>
+    <p:spTree>
+      <p:nvGrpSpPr>
+        <p:cNvPr id="1" name=""/>
+        <p:cNvGrpSpPr/>
+        <p:nvPr/>
+      </p:nvGrpSpPr>
+      <p:grpSpPr>
+        <a:xfrm>
+          <a:off x="0" y="0"/>
+          <a:ext cx="0" cy="0"/>
+          <a:chOff x="0" y="0"/>
+          <a:chExt cx="0" cy="0"/>
+        </a:xfrm>
+      </p:grpSpPr>
+      <p:pic>
+        <p:nvPicPr>
+          <p:cNvPr id="4" name="圖片 3">
+            <a:extLst>
+              <a:ext uri="{FF2B5EF4-FFF2-40B4-BE49-F238E27FC236}">
+                <a16:creationId xmlns:a16="http://schemas.microsoft.com/office/drawing/2014/main" id="{F7BBF3E5-2794-40EC-B071-9B55225F82F9}"/>
+              </a:ext>
+            </a:extLst>
+          </p:cNvPr>
+          <p:cNvPicPr>
+            <a:picLocks noChangeAspect="1"/>
+          </p:cNvPicPr>
+          <p:nvPr/>
+        </p:nvPicPr>
+        <p:blipFill>
+          <a:blip r:embed="rId2"/>
+          <a:stretch>
+            <a:fillRect/>
+          </a:stretch>
+        </p:blipFill>
+        <p:spPr>
+          <a:xfrm>
+            <a:off x="5198165" y="1067127"/>
+            <a:ext cx="4216584" cy="3411780"/>
+          </a:xfrm>
+          <a:prstGeom prst="rect">
+            <a:avLst/>
+          </a:prstGeom>
+        </p:spPr>
+      </p:pic>
+      <p:pic>
+        <p:nvPicPr>
+          <p:cNvPr id="5" name="圖片 4">
+            <a:extLst>
+              <a:ext uri="{FF2B5EF4-FFF2-40B4-BE49-F238E27FC236}">
+                <a16:creationId xmlns:a16="http://schemas.microsoft.com/office/drawing/2014/main" id="{238E296D-4607-44F3-9900-BADDE76D977F}"/>
+              </a:ext>
+            </a:extLst>
+          </p:cNvPr>
+          <p:cNvPicPr>
+            <a:picLocks noChangeAspect="1"/>
+          </p:cNvPicPr>
+          <p:nvPr/>
+        </p:nvPicPr>
+        <p:blipFill>
+          <a:blip r:embed="rId3"/>
+          <a:stretch>
+            <a:fillRect/>
+          </a:stretch>
+        </p:blipFill>
+        <p:spPr>
+          <a:xfrm>
+            <a:off x="791817" y="1067126"/>
+            <a:ext cx="4267200" cy="3411782"/>
+          </a:xfrm>
+          <a:prstGeom prst="rect">
+            <a:avLst/>
+          </a:prstGeom>
+        </p:spPr>
+      </p:pic>
+      <p:sp>
+        <p:nvSpPr>
+          <p:cNvPr id="6" name="矩形 5">
+            <a:extLst>
+              <a:ext uri="{FF2B5EF4-FFF2-40B4-BE49-F238E27FC236}">
+                <a16:creationId xmlns:a16="http://schemas.microsoft.com/office/drawing/2014/main" id="{7A744ED9-449E-4A95-A9D0-91E109699F67}"/>
+              </a:ext>
+            </a:extLst>
+          </p:cNvPr>
+          <p:cNvSpPr/>
+          <p:nvPr/>
+        </p:nvSpPr>
+        <p:spPr>
+          <a:xfrm>
+            <a:off x="2282279" y="4478906"/>
+            <a:ext cx="1286276" cy="646331"/>
+          </a:xfrm>
+          <a:prstGeom prst="rect">
+            <a:avLst/>
+          </a:prstGeom>
+          <a:noFill/>
+        </p:spPr>
+        <p:txBody>
+          <a:bodyPr wrap="square" lIns="91440" tIns="45720" rIns="91440" bIns="45720">
+            <a:spAutoFit/>
+          </a:bodyPr>
+          <a:lstStyle/>
+          <a:p>
+            <a:pPr algn="ctr"/>
+            <a:r>
+              <a:rPr lang="zh-TW" altLang="en-US" sz="3600" b="0" cap="none" spc="0" dirty="0">
+                <a:ln w="0"/>
+                <a:solidFill>
+                  <a:schemeClr val="tx1"/>
+                </a:solidFill>
+                <a:effectLst>
+                  <a:outerShdw blurRad="38100" dist="19050" dir="2700000" algn="tl" rotWithShape="0">
+                    <a:schemeClr val="dk1">
+                      <a:alpha val="40000"/>
+                    </a:schemeClr>
+                  </a:outerShdw>
+                </a:effectLst>
+                <a:latin typeface="微軟正黑體 Light" panose="020B0304030504040204" pitchFamily="34" charset="-120"/>
+                <a:ea typeface="微軟正黑體 Light" panose="020B0304030504040204" pitchFamily="34" charset="-120"/>
+              </a:rPr>
+              <a:t>原圖</a:t>
+            </a:r>
+          </a:p>
+        </p:txBody>
+      </p:sp>
+      <p:sp>
+        <p:nvSpPr>
+          <p:cNvPr id="7" name="矩形 6">
+            <a:extLst>
+              <a:ext uri="{FF2B5EF4-FFF2-40B4-BE49-F238E27FC236}">
+                <a16:creationId xmlns:a16="http://schemas.microsoft.com/office/drawing/2014/main" id="{ED681D58-38BE-4906-8C67-8AE69C3C0EEC}"/>
+              </a:ext>
+            </a:extLst>
+          </p:cNvPr>
+          <p:cNvSpPr/>
+          <p:nvPr/>
+        </p:nvSpPr>
+        <p:spPr>
+          <a:xfrm>
+            <a:off x="5963069" y="4478906"/>
+            <a:ext cx="3170991" cy="646331"/>
+          </a:xfrm>
+          <a:prstGeom prst="rect">
+            <a:avLst/>
+          </a:prstGeom>
+          <a:noFill/>
+        </p:spPr>
+        <p:txBody>
+          <a:bodyPr wrap="square" lIns="91440" tIns="45720" rIns="91440" bIns="45720">
+            <a:spAutoFit/>
+          </a:bodyPr>
+          <a:lstStyle/>
+          <a:p>
+            <a:pPr algn="ctr"/>
+            <a:r>
+              <a:rPr lang="zh-TW" altLang="en-US" sz="3600" b="0" cap="none" spc="0" dirty="0">
+                <a:ln w="0"/>
+                <a:solidFill>
+                  <a:schemeClr val="tx1"/>
+                </a:solidFill>
+                <a:effectLst>
+                  <a:outerShdw blurRad="38100" dist="19050" dir="2700000" algn="tl" rotWithShape="0">
+                    <a:schemeClr val="dk1">
+                      <a:alpha val="40000"/>
+                    </a:schemeClr>
+                  </a:outerShdw>
+                </a:effectLst>
+                <a:latin typeface="微軟正黑體 Light" panose="020B0304030504040204" pitchFamily="34" charset="-120"/>
+                <a:ea typeface="微軟正黑體 Light" panose="020B0304030504040204" pitchFamily="34" charset="-120"/>
+              </a:rPr>
+              <a:t>負片</a:t>
+            </a:r>
+            <a:r>
+              <a:rPr lang="en-US" altLang="zh-TW" sz="2000" b="0" cap="none" spc="0" dirty="0">
+                <a:ln w="0"/>
+                <a:solidFill>
+                  <a:schemeClr val="tx1"/>
+                </a:solidFill>
+                <a:effectLst>
+                  <a:outerShdw blurRad="38100" dist="19050" dir="2700000" algn="tl" rotWithShape="0">
+                    <a:schemeClr val="dk1">
+                      <a:alpha val="40000"/>
+                    </a:schemeClr>
+                  </a:outerShdw>
+                </a:effectLst>
+                <a:latin typeface="微軟正黑體 Light" panose="020B0304030504040204" pitchFamily="34" charset="-120"/>
+                <a:ea typeface="微軟正黑體 Light" panose="020B0304030504040204" pitchFamily="34" charset="-120"/>
+              </a:rPr>
+              <a:t>( </a:t>
+            </a:r>
+            <a:r>
+              <a:rPr lang="en-US" altLang="zh-TW" sz="2000" dirty="0">
+                <a:ln w="0"/>
+                <a:effectLst>
+                  <a:outerShdw blurRad="38100" dist="19050" dir="2700000" algn="tl" rotWithShape="0">
+                    <a:schemeClr val="dk1">
+                      <a:alpha val="40000"/>
+                    </a:schemeClr>
+                  </a:outerShdw>
+                </a:effectLst>
+                <a:latin typeface="微軟正黑體 Light" panose="020B0304030504040204" pitchFamily="34" charset="-120"/>
+                <a:ea typeface="微軟正黑體 Light" panose="020B0304030504040204" pitchFamily="34" charset="-120"/>
+              </a:rPr>
+              <a:t>255-</a:t>
+            </a:r>
+            <a:r>
+              <a:rPr lang="zh-TW" altLang="en-US" sz="2000" dirty="0">
+                <a:ln w="0"/>
+                <a:effectLst>
+                  <a:outerShdw blurRad="38100" dist="19050" dir="2700000" algn="tl" rotWithShape="0">
+                    <a:schemeClr val="dk1">
+                      <a:alpha val="40000"/>
+                    </a:schemeClr>
+                  </a:outerShdw>
+                </a:effectLst>
+                <a:latin typeface="微軟正黑體 Light" panose="020B0304030504040204" pitchFamily="34" charset="-120"/>
+                <a:ea typeface="微軟正黑體 Light" panose="020B0304030504040204" pitchFamily="34" charset="-120"/>
+              </a:rPr>
+              <a:t>陣列 </a:t>
+            </a:r>
+            <a:r>
+              <a:rPr lang="en-US" altLang="zh-TW" sz="2000" b="0" cap="none" spc="0" dirty="0">
+                <a:ln w="0"/>
+                <a:solidFill>
+                  <a:schemeClr val="tx1"/>
+                </a:solidFill>
+                <a:effectLst>
+                  <a:outerShdw blurRad="38100" dist="19050" dir="2700000" algn="tl" rotWithShape="0">
+                    <a:schemeClr val="dk1">
+                      <a:alpha val="40000"/>
+                    </a:schemeClr>
+                  </a:outerShdw>
+                </a:effectLst>
+                <a:latin typeface="微軟正黑體 Light" panose="020B0304030504040204" pitchFamily="34" charset="-120"/>
+                <a:ea typeface="微軟正黑體 Light" panose="020B0304030504040204" pitchFamily="34" charset="-120"/>
+              </a:rPr>
+              <a:t>)</a:t>
+            </a:r>
+            <a:endParaRPr lang="zh-TW" altLang="en-US" sz="3600" b="0" cap="none" spc="0" dirty="0">
+              <a:ln w="0"/>
+              <a:solidFill>
+                <a:schemeClr val="tx1"/>
+              </a:solidFill>
+              <a:effectLst>
+                <a:outerShdw blurRad="38100" dist="19050" dir="2700000" algn="tl" rotWithShape="0">
+                  <a:schemeClr val="dk1">
+                    <a:alpha val="40000"/>
+                  </a:schemeClr>
+                </a:outerShdw>
+              </a:effectLst>
+              <a:latin typeface="微軟正黑體 Light" panose="020B0304030504040204" pitchFamily="34" charset="-120"/>
+              <a:ea typeface="微軟正黑體 Light" panose="020B0304030504040204" pitchFamily="34" charset="-120"/>
+            </a:endParaRPr>
+          </a:p>
+        </p:txBody>
+      </p:sp>
+    </p:spTree>
+    <p:extLst>
+      <p:ext uri="{BB962C8B-B14F-4D97-AF65-F5344CB8AC3E}">
+        <p14:creationId xmlns:p14="http://schemas.microsoft.com/office/powerpoint/2010/main" val="1608218421"/>
+      </p:ext>
+    </p:extLst>
+  </p:cSld>
+  <p:clrMapOvr>
+    <a:masterClrMapping/>
+  </p:clrMapOvr>
+</p:sld>
+</file>
+
+<file path=ppt/slides/slide6.xml><?xml version="1.0" encoding="utf-8"?>
+<p:sld xmlns:a="http://schemas.openxmlformats.org/drawingml/2006/main" xmlns:r="http://schemas.openxmlformats.org/officeDocument/2006/relationships" xmlns:p="http://schemas.openxmlformats.org/presentationml/2006/main">
+  <p:cSld>
+    <p:spTree>
+      <p:nvGrpSpPr>
+        <p:cNvPr id="1" name=""/>
+        <p:cNvGrpSpPr/>
+        <p:nvPr/>
+      </p:nvGrpSpPr>
+      <p:grpSpPr>
+        <a:xfrm>
+          <a:off x="0" y="0"/>
+          <a:ext cx="0" cy="0"/>
+          <a:chOff x="0" y="0"/>
+          <a:chExt cx="0" cy="0"/>
+        </a:xfrm>
+      </p:grpSpPr>
+      <p:pic>
+        <p:nvPicPr>
+          <p:cNvPr id="5" name="圖片 4">
+            <a:extLst>
+              <a:ext uri="{FF2B5EF4-FFF2-40B4-BE49-F238E27FC236}">
+                <a16:creationId xmlns:a16="http://schemas.microsoft.com/office/drawing/2014/main" id="{238E296D-4607-44F3-9900-BADDE76D977F}"/>
+              </a:ext>
+            </a:extLst>
+          </p:cNvPr>
+          <p:cNvPicPr>
+            <a:picLocks noChangeAspect="1"/>
+          </p:cNvPicPr>
+          <p:nvPr/>
+        </p:nvPicPr>
+        <p:blipFill>
+          <a:blip r:embed="rId2"/>
+          <a:stretch>
+            <a:fillRect/>
+          </a:stretch>
+        </p:blipFill>
+        <p:spPr>
+          <a:xfrm>
+            <a:off x="791817" y="1067126"/>
+            <a:ext cx="4267200" cy="3411782"/>
+          </a:xfrm>
+          <a:prstGeom prst="rect">
+            <a:avLst/>
+          </a:prstGeom>
+        </p:spPr>
+      </p:pic>
+      <p:sp>
+        <p:nvSpPr>
+          <p:cNvPr id="6" name="矩形 5">
+            <a:extLst>
+              <a:ext uri="{FF2B5EF4-FFF2-40B4-BE49-F238E27FC236}">
+                <a16:creationId xmlns:a16="http://schemas.microsoft.com/office/drawing/2014/main" id="{7A744ED9-449E-4A95-A9D0-91E109699F67}"/>
+              </a:ext>
+            </a:extLst>
+          </p:cNvPr>
+          <p:cNvSpPr/>
+          <p:nvPr/>
+        </p:nvSpPr>
+        <p:spPr>
+          <a:xfrm>
+            <a:off x="2282279" y="4478906"/>
+            <a:ext cx="1286276" cy="461665"/>
+          </a:xfrm>
+          <a:prstGeom prst="rect">
+            <a:avLst/>
+          </a:prstGeom>
+          <a:noFill/>
+        </p:spPr>
+        <p:txBody>
+          <a:bodyPr wrap="square" lIns="91440" tIns="45720" rIns="91440" bIns="45720">
+            <a:spAutoFit/>
+          </a:bodyPr>
+          <a:lstStyle/>
+          <a:p>
+            <a:pPr algn="ctr"/>
+            <a:r>
+              <a:rPr lang="zh-TW" altLang="en-US" sz="2400" b="0" cap="none" spc="0" dirty="0">
+                <a:ln w="0"/>
+                <a:solidFill>
+                  <a:schemeClr val="tx1"/>
+                </a:solidFill>
+                <a:effectLst>
+                  <a:outerShdw blurRad="38100" dist="19050" dir="2700000" algn="tl" rotWithShape="0">
+                    <a:schemeClr val="dk1">
+                      <a:alpha val="40000"/>
+                    </a:schemeClr>
+                  </a:outerShdw>
+                </a:effectLst>
+                <a:latin typeface="微軟正黑體 Light" panose="020B0304030504040204" pitchFamily="34" charset="-120"/>
+                <a:ea typeface="微軟正黑體 Light" panose="020B0304030504040204" pitchFamily="34" charset="-120"/>
+              </a:rPr>
+              <a:t>原圖</a:t>
+            </a:r>
+          </a:p>
+        </p:txBody>
+      </p:sp>
+      <p:sp>
+        <p:nvSpPr>
+          <p:cNvPr id="7" name="矩形 6">
+            <a:extLst>
+              <a:ext uri="{FF2B5EF4-FFF2-40B4-BE49-F238E27FC236}">
+                <a16:creationId xmlns:a16="http://schemas.microsoft.com/office/drawing/2014/main" id="{ED681D58-38BE-4906-8C67-8AE69C3C0EEC}"/>
+              </a:ext>
+            </a:extLst>
+          </p:cNvPr>
+          <p:cNvSpPr/>
+          <p:nvPr/>
+        </p:nvSpPr>
+        <p:spPr>
+          <a:xfrm>
+            <a:off x="5943190" y="4571238"/>
+            <a:ext cx="3170991" cy="461665"/>
+          </a:xfrm>
+          <a:prstGeom prst="rect">
+            <a:avLst/>
+          </a:prstGeom>
+          <a:noFill/>
+        </p:spPr>
+        <p:txBody>
+          <a:bodyPr wrap="square" lIns="91440" tIns="45720" rIns="91440" bIns="45720">
+            <a:spAutoFit/>
+          </a:bodyPr>
+          <a:lstStyle/>
+          <a:p>
+            <a:pPr algn="ctr"/>
+            <a:r>
+              <a:rPr lang="en-US" altLang="zh-TW" sz="2400" dirty="0">
+                <a:ln w="0"/>
+                <a:effectLst>
+                  <a:outerShdw blurRad="38100" dist="19050" dir="2700000" algn="tl" rotWithShape="0">
+                    <a:schemeClr val="dk1">
+                      <a:alpha val="40000"/>
+                    </a:schemeClr>
+                  </a:outerShdw>
+                </a:effectLst>
+                <a:latin typeface="微軟正黑體 Light" panose="020B0304030504040204" pitchFamily="34" charset="-120"/>
+                <a:ea typeface="微軟正黑體 Light" panose="020B0304030504040204" pitchFamily="34" charset="-120"/>
+              </a:rPr>
+              <a:t>Canny</a:t>
+            </a:r>
+            <a:r>
+              <a:rPr lang="zh-TW" altLang="en-US" sz="2400" dirty="0">
+                <a:ln w="0"/>
+                <a:effectLst>
+                  <a:outerShdw blurRad="38100" dist="19050" dir="2700000" algn="tl" rotWithShape="0">
+                    <a:schemeClr val="dk1">
+                      <a:alpha val="40000"/>
+                    </a:schemeClr>
+                  </a:outerShdw>
+                </a:effectLst>
+                <a:latin typeface="微軟正黑體 Light" panose="020B0304030504040204" pitchFamily="34" charset="-120"/>
+                <a:ea typeface="微軟正黑體 Light" panose="020B0304030504040204" pitchFamily="34" charset="-120"/>
+              </a:rPr>
+              <a:t>邊緣偵測</a:t>
+            </a:r>
+            <a:endParaRPr lang="zh-TW" altLang="en-US" sz="2400" b="0" cap="none" spc="0" dirty="0">
+              <a:ln w="0"/>
+              <a:solidFill>
+                <a:schemeClr val="tx1"/>
+              </a:solidFill>
+              <a:effectLst>
+                <a:outerShdw blurRad="38100" dist="19050" dir="2700000" algn="tl" rotWithShape="0">
+                  <a:schemeClr val="dk1">
+                    <a:alpha val="40000"/>
+                  </a:schemeClr>
+                </a:outerShdw>
+              </a:effectLst>
+              <a:latin typeface="微軟正黑體 Light" panose="020B0304030504040204" pitchFamily="34" charset="-120"/>
+              <a:ea typeface="微軟正黑體 Light" panose="020B0304030504040204" pitchFamily="34" charset="-120"/>
+            </a:endParaRPr>
+          </a:p>
+        </p:txBody>
+      </p:sp>
+      <p:pic>
+        <p:nvPicPr>
+          <p:cNvPr id="2" name="圖片 1">
+            <a:extLst>
+              <a:ext uri="{FF2B5EF4-FFF2-40B4-BE49-F238E27FC236}">
+                <a16:creationId xmlns:a16="http://schemas.microsoft.com/office/drawing/2014/main" id="{5F3B2548-C2C5-40B2-84F7-DF06481A042A}"/>
+              </a:ext>
+            </a:extLst>
+          </p:cNvPr>
+          <p:cNvPicPr>
+            <a:picLocks noChangeAspect="1"/>
+          </p:cNvPicPr>
+          <p:nvPr/>
+        </p:nvPicPr>
+        <p:blipFill>
+          <a:blip r:embed="rId3"/>
+          <a:stretch>
+            <a:fillRect/>
+          </a:stretch>
+        </p:blipFill>
+        <p:spPr>
+          <a:xfrm>
+            <a:off x="5216375" y="1067126"/>
+            <a:ext cx="4272143" cy="3411780"/>
+          </a:xfrm>
+          <a:prstGeom prst="rect">
+            <a:avLst/>
+          </a:prstGeom>
+        </p:spPr>
+      </p:pic>
+    </p:spTree>
+    <p:extLst>
+      <p:ext uri="{BB962C8B-B14F-4D97-AF65-F5344CB8AC3E}">
+        <p14:creationId xmlns:p14="http://schemas.microsoft.com/office/powerpoint/2010/main" val="2819928764"/>
+      </p:ext>
+    </p:extLst>
+  </p:cSld>
+  <p:clrMapOvr>
+    <a:masterClrMapping/>
+  </p:clrMapOvr>
+</p:sld>
+</file>
+
+<file path=ppt/slides/slide7.xml><?xml version="1.0" encoding="utf-8"?>
+<p:sld xmlns:a="http://schemas.openxmlformats.org/drawingml/2006/main" xmlns:r="http://schemas.openxmlformats.org/officeDocument/2006/relationships" xmlns:p="http://schemas.openxmlformats.org/presentationml/2006/main">
+  <p:cSld>
+    <p:spTree>
+      <p:nvGrpSpPr>
+        <p:cNvPr id="1" name=""/>
+        <p:cNvGrpSpPr/>
+        <p:nvPr/>
+      </p:nvGrpSpPr>
+      <p:grpSpPr>
+        <a:xfrm>
+          <a:off x="0" y="0"/>
+          <a:ext cx="0" cy="0"/>
+          <a:chOff x="0" y="0"/>
+          <a:chExt cx="0" cy="0"/>
+        </a:xfrm>
+      </p:grpSpPr>
+      <p:pic>
+        <p:nvPicPr>
+          <p:cNvPr id="4" name="圖片 3">
+            <a:extLst>
+              <a:ext uri="{FF2B5EF4-FFF2-40B4-BE49-F238E27FC236}">
+                <a16:creationId xmlns:a16="http://schemas.microsoft.com/office/drawing/2014/main" id="{552EFCC5-C36C-41A7-B27B-E04FE0DCD59A}"/>
+              </a:ext>
+            </a:extLst>
+          </p:cNvPr>
+          <p:cNvPicPr>
+            <a:picLocks noChangeAspect="1"/>
+          </p:cNvPicPr>
+          <p:nvPr/>
+        </p:nvPicPr>
+        <p:blipFill>
+          <a:blip r:embed="rId2"/>
+          <a:stretch>
+            <a:fillRect/>
+          </a:stretch>
+        </p:blipFill>
+        <p:spPr>
+          <a:xfrm>
+            <a:off x="1162880" y="1181991"/>
+            <a:ext cx="4260572" cy="3321202"/>
+          </a:xfrm>
+          <a:prstGeom prst="rect">
+            <a:avLst/>
+          </a:prstGeom>
+          <a:ln w="3175" cap="sq">
+            <a:solidFill>
+              <a:srgbClr val="000000"/>
+            </a:solidFill>
+            <a:prstDash val="solid"/>
+            <a:miter lim="800000"/>
+          </a:ln>
+          <a:effectLst>
+            <a:outerShdw blurRad="50800" dist="38100" dir="2700000" algn="tl" rotWithShape="0">
+              <a:srgbClr val="000000">
+                <a:alpha val="43000"/>
+              </a:srgbClr>
+            </a:outerShdw>
+          </a:effectLst>
+        </p:spPr>
+      </p:pic>
+      <p:pic>
+        <p:nvPicPr>
+          <p:cNvPr id="5" name="圖片 4">
+            <a:extLst>
+              <a:ext uri="{FF2B5EF4-FFF2-40B4-BE49-F238E27FC236}">
+                <a16:creationId xmlns:a16="http://schemas.microsoft.com/office/drawing/2014/main" id="{76C1865B-BEB0-4DBC-9F06-5B7D508FE90A}"/>
+              </a:ext>
+            </a:extLst>
+          </p:cNvPr>
+          <p:cNvPicPr>
+            <a:picLocks noChangeAspect="1"/>
+          </p:cNvPicPr>
+          <p:nvPr/>
+        </p:nvPicPr>
+        <p:blipFill>
+          <a:blip r:embed="rId3"/>
+          <a:stretch>
+            <a:fillRect/>
+          </a:stretch>
+        </p:blipFill>
+        <p:spPr>
+          <a:xfrm>
+            <a:off x="5608848" y="1181991"/>
+            <a:ext cx="4622753" cy="3321201"/>
+          </a:xfrm>
+          <a:prstGeom prst="rect">
+            <a:avLst/>
+          </a:prstGeom>
+          <a:ln w="3175" cap="sq">
+            <a:solidFill>
+              <a:srgbClr val="000000"/>
+            </a:solidFill>
+            <a:prstDash val="solid"/>
+            <a:miter lim="800000"/>
+          </a:ln>
+          <a:effectLst>
+            <a:outerShdw blurRad="50800" dist="38100" dir="2700000" algn="tl" rotWithShape="0">
+              <a:srgbClr val="000000">
+                <a:alpha val="43000"/>
+              </a:srgbClr>
+            </a:outerShdw>
+          </a:effectLst>
+        </p:spPr>
+      </p:pic>
+    </p:spTree>
+    <p:extLst>
+      <p:ext uri="{BB962C8B-B14F-4D97-AF65-F5344CB8AC3E}">
+        <p14:creationId xmlns:p14="http://schemas.microsoft.com/office/powerpoint/2010/main" val="471769766"/>
+      </p:ext>
+    </p:extLst>
+  </p:cSld>
+  <p:clrMapOvr>
+    <a:masterClrMapping/>
+  </p:clrMapOvr>
+</p:sld>
+</file>
+
 <file path=ppt/theme/theme1.xml><?xml version="1.0" encoding="utf-8"?>
 <a:theme xmlns:a="http://schemas.openxmlformats.org/drawingml/2006/main" name="Office 佈景主題">
   <a:themeElements>

</xml_diff>